<commit_message>
Too tired to comment well.
</commit_message>
<xml_diff>
--- a/figures/src_PPT_files/ML_summary_figure.pptx
+++ b/figures/src_PPT_files/ML_summary_figure.pptx
@@ -6511,7 +6511,7 @@
             <p:nvPr>
               <p:extLst>
                 <p:ext uri="{D42A27DB-BD31-4B8C-83A1-F6EECF244321}">
-                  <p14:modId xmlns:p14="http://schemas.microsoft.com/office/powerpoint/2010/main" val="2992175220"/>
+                  <p14:modId xmlns:p14="http://schemas.microsoft.com/office/powerpoint/2010/main" val="2729184784"/>
                 </p:ext>
               </p:extLst>
             </p:nvPr>
@@ -6524,7 +6524,7 @@
             <a:graphicData uri="http://schemas.openxmlformats.org/presentationml/2006/ole">
               <mc:AlternateContent xmlns:mc="http://schemas.openxmlformats.org/markup-compatibility/2006">
                 <mc:Choice xmlns:v="urn:schemas-microsoft-com:vml" Requires="v">
-                  <p:oleObj spid="_x0000_s1035" name="Equation" r:id="rId6" imgW="1218960" imgH="787320" progId="Equation.DSMT4">
+                  <p:oleObj spid="_x0000_s1038" name="Equation" r:id="rId6" imgW="1218960" imgH="787320" progId="Equation.DSMT4">
                     <p:embed/>
                   </p:oleObj>
                 </mc:Choice>
@@ -6588,7 +6588,7 @@
           <a:graphicData uri="http://schemas.openxmlformats.org/presentationml/2006/ole">
             <mc:AlternateContent xmlns:mc="http://schemas.openxmlformats.org/markup-compatibility/2006">
               <mc:Choice xmlns:v="urn:schemas-microsoft-com:vml" Requires="v">
-                <p:oleObj spid="_x0000_s1036" name="Equation" r:id="rId8" imgW="914400" imgH="306720" progId="Equation.DSMT4">
+                <p:oleObj spid="_x0000_s1039" name="Equation" r:id="rId8" imgW="914400" imgH="306720" progId="Equation.DSMT4">
                   <p:embed/>
                 </p:oleObj>
               </mc:Choice>
@@ -6729,7 +6729,7 @@
             <p:nvPr>
               <p:extLst>
                 <p:ext uri="{D42A27DB-BD31-4B8C-83A1-F6EECF244321}">
-                  <p14:modId xmlns:p14="http://schemas.microsoft.com/office/powerpoint/2010/main" val="284512435"/>
+                  <p14:modId xmlns:p14="http://schemas.microsoft.com/office/powerpoint/2010/main" val="371822181"/>
                 </p:ext>
               </p:extLst>
             </p:nvPr>
@@ -6742,7 +6742,7 @@
             <a:graphicData uri="http://schemas.openxmlformats.org/presentationml/2006/ole">
               <mc:AlternateContent xmlns:mc="http://schemas.openxmlformats.org/markup-compatibility/2006">
                 <mc:Choice xmlns:v="urn:schemas-microsoft-com:vml" Requires="v">
-                  <p:oleObj spid="_x0000_s1037" name="Equation" r:id="rId10" imgW="3543120" imgH="431640" progId="Equation.DSMT4">
+                  <p:oleObj spid="_x0000_s1040" name="Equation" r:id="rId10" imgW="3543120" imgH="431640" progId="Equation.DSMT4">
                     <p:embed/>
                   </p:oleObj>
                 </mc:Choice>

</xml_diff>